<commit_message>
Some more code for Functions and Methods
Presentation Update
Code added for new files
</commit_message>
<xml_diff>
--- a/presentations/GIAIC_05-Methods and Functions.pptx
+++ b/presentations/GIAIC_05-Methods and Functions.pptx
@@ -5,7 +5,7 @@
     <p:sldMasterId id="2147483660" r:id="rId1"/>
   </p:sldMasterIdLst>
   <p:notesMasterIdLst>
-    <p:notesMasterId r:id="rId16"/>
+    <p:notesMasterId r:id="rId20"/>
   </p:notesMasterIdLst>
   <p:sldIdLst>
     <p:sldId id="256" r:id="rId2"/>
@@ -21,7 +21,11 @@
     <p:sldId id="296" r:id="rId12"/>
     <p:sldId id="297" r:id="rId13"/>
     <p:sldId id="298" r:id="rId14"/>
-    <p:sldId id="286" r:id="rId15"/>
+    <p:sldId id="299" r:id="rId15"/>
+    <p:sldId id="300" r:id="rId16"/>
+    <p:sldId id="301" r:id="rId17"/>
+    <p:sldId id="302" r:id="rId18"/>
+    <p:sldId id="286" r:id="rId19"/>
   </p:sldIdLst>
   <p:sldSz cx="12192000" cy="6858000"/>
   <p:notesSz cx="6858000" cy="9144000"/>
@@ -210,7 +214,7 @@
           <a:p>
             <a:fld id="{8C195E4A-F2A4-40FF-AB17-B7CFCA739002}" type="datetimeFigureOut">
               <a:rPr lang="en-US" smtClean="0"/>
-              <a:t>5/3/2024</a:t>
+              <a:t>5/4/2024</a:t>
             </a:fld>
             <a:endParaRPr lang="en-US"/>
           </a:p>
@@ -1195,7 +1199,7 @@
           <a:p>
             <a:fld id="{67A87054-9D44-4E67-9A91-C36F6B83E6F4}" type="datetimeFigureOut">
               <a:rPr lang="en-US" smtClean="0"/>
-              <a:t>5/3/2024</a:t>
+              <a:t>5/4/2024</a:t>
             </a:fld>
             <a:endParaRPr lang="en-US"/>
           </a:p>
@@ -2294,7 +2298,7 @@
           <a:p>
             <a:fld id="{67A87054-9D44-4E67-9A91-C36F6B83E6F4}" type="datetimeFigureOut">
               <a:rPr lang="en-US" smtClean="0"/>
-              <a:t>5/3/2024</a:t>
+              <a:t>5/4/2024</a:t>
             </a:fld>
             <a:endParaRPr lang="en-US"/>
           </a:p>
@@ -3290,7 +3294,7 @@
           <a:p>
             <a:fld id="{67A87054-9D44-4E67-9A91-C36F6B83E6F4}" type="datetimeFigureOut">
               <a:rPr lang="en-US" smtClean="0"/>
-              <a:t>5/3/2024</a:t>
+              <a:t>5/4/2024</a:t>
             </a:fld>
             <a:endParaRPr lang="en-US"/>
           </a:p>
@@ -4440,7 +4444,7 @@
           <a:p>
             <a:fld id="{67A87054-9D44-4E67-9A91-C36F6B83E6F4}" type="datetimeFigureOut">
               <a:rPr lang="en-US" smtClean="0"/>
-              <a:t>5/3/2024</a:t>
+              <a:t>5/4/2024</a:t>
             </a:fld>
             <a:endParaRPr lang="en-US"/>
           </a:p>
@@ -5489,7 +5493,7 @@
           <a:p>
             <a:fld id="{67A87054-9D44-4E67-9A91-C36F6B83E6F4}" type="datetimeFigureOut">
               <a:rPr lang="en-US" smtClean="0"/>
-              <a:t>5/3/2024</a:t>
+              <a:t>5/4/2024</a:t>
             </a:fld>
             <a:endParaRPr lang="en-US"/>
           </a:p>
@@ -6165,7 +6169,7 @@
           <a:p>
             <a:fld id="{67A87054-9D44-4E67-9A91-C36F6B83E6F4}" type="datetimeFigureOut">
               <a:rPr lang="en-US" smtClean="0"/>
-              <a:t>5/3/2024</a:t>
+              <a:t>5/4/2024</a:t>
             </a:fld>
             <a:endParaRPr lang="en-US"/>
           </a:p>
@@ -7042,7 +7046,7 @@
           <a:p>
             <a:fld id="{67A87054-9D44-4E67-9A91-C36F6B83E6F4}" type="datetimeFigureOut">
               <a:rPr lang="en-US" smtClean="0"/>
-              <a:t>5/3/2024</a:t>
+              <a:t>5/4/2024</a:t>
             </a:fld>
             <a:endParaRPr lang="en-US"/>
           </a:p>
@@ -7238,7 +7242,7 @@
           <a:p>
             <a:fld id="{67A87054-9D44-4E67-9A91-C36F6B83E6F4}" type="datetimeFigureOut">
               <a:rPr lang="en-US" smtClean="0"/>
-              <a:t>5/3/2024</a:t>
+              <a:t>5/4/2024</a:t>
             </a:fld>
             <a:endParaRPr lang="en-US"/>
           </a:p>
@@ -8221,7 +8225,7 @@
           <a:p>
             <a:fld id="{67A87054-9D44-4E67-9A91-C36F6B83E6F4}" type="datetimeFigureOut">
               <a:rPr lang="en-US" smtClean="0"/>
-              <a:t>5/3/2024</a:t>
+              <a:t>5/4/2024</a:t>
             </a:fld>
             <a:endParaRPr lang="en-US"/>
           </a:p>
@@ -9457,7 +9461,7 @@
           <a:p>
             <a:fld id="{67A87054-9D44-4E67-9A91-C36F6B83E6F4}" type="datetimeFigureOut">
               <a:rPr lang="en-US" smtClean="0"/>
-              <a:t>5/3/2024</a:t>
+              <a:t>5/4/2024</a:t>
             </a:fld>
             <a:endParaRPr lang="en-US"/>
           </a:p>
@@ -9745,7 +9749,7 @@
           <a:p>
             <a:fld id="{67A87054-9D44-4E67-9A91-C36F6B83E6F4}" type="datetimeFigureOut">
               <a:rPr lang="en-US" smtClean="0"/>
-              <a:t>5/3/2024</a:t>
+              <a:t>5/4/2024</a:t>
             </a:fld>
             <a:endParaRPr lang="en-US"/>
           </a:p>
@@ -10171,7 +10175,7 @@
           <a:p>
             <a:fld id="{67A87054-9D44-4E67-9A91-C36F6B83E6F4}" type="datetimeFigureOut">
               <a:rPr lang="en-US" smtClean="0"/>
-              <a:t>5/3/2024</a:t>
+              <a:t>5/4/2024</a:t>
             </a:fld>
             <a:endParaRPr lang="en-US"/>
           </a:p>
@@ -10314,7 +10318,7 @@
           <a:p>
             <a:fld id="{67A87054-9D44-4E67-9A91-C36F6B83E6F4}" type="datetimeFigureOut">
               <a:rPr lang="en-US" smtClean="0"/>
-              <a:t>5/3/2024</a:t>
+              <a:t>5/4/2024</a:t>
             </a:fld>
             <a:endParaRPr lang="en-US"/>
           </a:p>
@@ -10425,7 +10429,7 @@
           <a:p>
             <a:fld id="{67A87054-9D44-4E67-9A91-C36F6B83E6F4}" type="datetimeFigureOut">
               <a:rPr lang="en-US" smtClean="0"/>
-              <a:t>5/3/2024</a:t>
+              <a:t>5/4/2024</a:t>
             </a:fld>
             <a:endParaRPr lang="en-US"/>
           </a:p>
@@ -11522,7 +11526,7 @@
           <a:p>
             <a:fld id="{67A87054-9D44-4E67-9A91-C36F6B83E6F4}" type="datetimeFigureOut">
               <a:rPr lang="en-US" smtClean="0"/>
-              <a:t>5/3/2024</a:t>
+              <a:t>5/4/2024</a:t>
             </a:fld>
             <a:endParaRPr lang="en-US"/>
           </a:p>
@@ -12646,7 +12650,7 @@
           <a:p>
             <a:fld id="{67A87054-9D44-4E67-9A91-C36F6B83E6F4}" type="datetimeFigureOut">
               <a:rPr lang="en-US" smtClean="0"/>
-              <a:t>5/3/2024</a:t>
+              <a:t>5/4/2024</a:t>
             </a:fld>
             <a:endParaRPr lang="en-US"/>
           </a:p>
@@ -14891,6 +14895,478 @@
 </file>
 
 <file path=ppt/slides/slide14.xml><?xml version="1.0" encoding="utf-8"?>
+<p:sld xmlns:a="http://schemas.openxmlformats.org/drawingml/2006/main" xmlns:r="http://schemas.openxmlformats.org/officeDocument/2006/relationships" xmlns:p="http://schemas.openxmlformats.org/presentationml/2006/main">
+  <p:cSld>
+    <p:spTree>
+      <p:nvGrpSpPr>
+        <p:cNvPr id="1" name=""/>
+        <p:cNvGrpSpPr/>
+        <p:nvPr/>
+      </p:nvGrpSpPr>
+      <p:grpSpPr>
+        <a:xfrm>
+          <a:off x="0" y="0"/>
+          <a:ext cx="0" cy="0"/>
+          <a:chOff x="0" y="0"/>
+          <a:chExt cx="0" cy="0"/>
+        </a:xfrm>
+      </p:grpSpPr>
+      <p:sp>
+        <p:nvSpPr>
+          <p:cNvPr id="2" name="Title 1">
+            <a:extLst>
+              <a:ext uri="{FF2B5EF4-FFF2-40B4-BE49-F238E27FC236}">
+                <a16:creationId xmlns:a16="http://schemas.microsoft.com/office/drawing/2014/main" id="{8E6D080E-3E78-EC79-FA11-27699277274E}"/>
+              </a:ext>
+            </a:extLst>
+          </p:cNvPr>
+          <p:cNvSpPr>
+            <a:spLocks noGrp="1"/>
+          </p:cNvSpPr>
+          <p:nvPr>
+            <p:ph type="title"/>
+          </p:nvPr>
+        </p:nvSpPr>
+        <p:spPr/>
+        <p:txBody>
+          <a:bodyPr/>
+          <a:lstStyle/>
+          <a:p>
+            <a:r>
+              <a:rPr lang="en-US" dirty="0"/>
+              <a:t>Access Modifiers</a:t>
+            </a:r>
+          </a:p>
+        </p:txBody>
+      </p:sp>
+      <p:sp>
+        <p:nvSpPr>
+          <p:cNvPr id="3" name="Content Placeholder 2">
+            <a:extLst>
+              <a:ext uri="{FF2B5EF4-FFF2-40B4-BE49-F238E27FC236}">
+                <a16:creationId xmlns:a16="http://schemas.microsoft.com/office/drawing/2014/main" id="{B398137E-5F81-449A-151D-1B3E63FE5630}"/>
+              </a:ext>
+            </a:extLst>
+          </p:cNvPr>
+          <p:cNvSpPr>
+            <a:spLocks noGrp="1"/>
+          </p:cNvSpPr>
+          <p:nvPr>
+            <p:ph idx="1"/>
+          </p:nvPr>
+        </p:nvSpPr>
+        <p:spPr/>
+        <p:txBody>
+          <a:bodyPr>
+            <a:normAutofit fontScale="92500" lnSpcReduction="20000"/>
+          </a:bodyPr>
+          <a:lstStyle/>
+          <a:p>
+            <a:pPr algn="just"/>
+            <a:r>
+              <a:rPr lang="en-US" dirty="0"/>
+              <a:t>Access modifiers in TypeScript are keywords that set the accessibility of properties and methods within a class.</a:t>
+            </a:r>
+          </a:p>
+          <a:p>
+            <a:pPr algn="just"/>
+            <a:r>
+              <a:rPr lang="en-US" dirty="0"/>
+              <a:t>Public</a:t>
+            </a:r>
+          </a:p>
+          <a:p>
+            <a:pPr lvl="1" algn="just"/>
+            <a:r>
+              <a:rPr lang="en-US" dirty="0"/>
+              <a:t>Accessible from anywhere</a:t>
+            </a:r>
+          </a:p>
+          <a:p>
+            <a:pPr lvl="1" algn="just"/>
+            <a:r>
+              <a:rPr lang="en-US" dirty="0"/>
+              <a:t>No restrictions on visibility</a:t>
+            </a:r>
+          </a:p>
+          <a:p>
+            <a:pPr algn="just"/>
+            <a:r>
+              <a:rPr lang="en-US" dirty="0"/>
+              <a:t>Private</a:t>
+            </a:r>
+          </a:p>
+          <a:p>
+            <a:pPr lvl="1" algn="just"/>
+            <a:r>
+              <a:rPr lang="en-US" dirty="0"/>
+              <a:t>Restricted to the class scope</a:t>
+            </a:r>
+          </a:p>
+          <a:p>
+            <a:pPr lvl="1" algn="just"/>
+            <a:r>
+              <a:rPr lang="en-US" dirty="0"/>
+              <a:t>Ensures encapsulation of class internals</a:t>
+            </a:r>
+          </a:p>
+          <a:p>
+            <a:pPr algn="just"/>
+            <a:r>
+              <a:rPr lang="en-US" dirty="0"/>
+              <a:t>Protected</a:t>
+            </a:r>
+          </a:p>
+          <a:p>
+            <a:pPr lvl="1" algn="just"/>
+            <a:r>
+              <a:rPr lang="en-US" dirty="0"/>
+              <a:t>Similar to private but also accessible in subclasses</a:t>
+            </a:r>
+          </a:p>
+          <a:p>
+            <a:pPr lvl="1" algn="just"/>
+            <a:r>
+              <a:rPr lang="en-US" dirty="0"/>
+              <a:t>Useful for class inheritance patterns</a:t>
+            </a:r>
+          </a:p>
+        </p:txBody>
+      </p:sp>
+    </p:spTree>
+    <p:extLst>
+      <p:ext uri="{BB962C8B-B14F-4D97-AF65-F5344CB8AC3E}">
+        <p14:creationId xmlns:p14="http://schemas.microsoft.com/office/powerpoint/2010/main" val="1578764762"/>
+      </p:ext>
+    </p:extLst>
+  </p:cSld>
+  <p:clrMapOvr>
+    <a:masterClrMapping/>
+  </p:clrMapOvr>
+</p:sld>
+</file>
+
+<file path=ppt/slides/slide15.xml><?xml version="1.0" encoding="utf-8"?>
+<p:sld xmlns:a="http://schemas.openxmlformats.org/drawingml/2006/main" xmlns:r="http://schemas.openxmlformats.org/officeDocument/2006/relationships" xmlns:p="http://schemas.openxmlformats.org/presentationml/2006/main">
+  <p:cSld>
+    <p:spTree>
+      <p:nvGrpSpPr>
+        <p:cNvPr id="1" name=""/>
+        <p:cNvGrpSpPr/>
+        <p:nvPr/>
+      </p:nvGrpSpPr>
+      <p:grpSpPr>
+        <a:xfrm>
+          <a:off x="0" y="0"/>
+          <a:ext cx="0" cy="0"/>
+          <a:chOff x="0" y="0"/>
+          <a:chExt cx="0" cy="0"/>
+        </a:xfrm>
+      </p:grpSpPr>
+      <p:sp>
+        <p:nvSpPr>
+          <p:cNvPr id="2" name="Title 1">
+            <a:extLst>
+              <a:ext uri="{FF2B5EF4-FFF2-40B4-BE49-F238E27FC236}">
+                <a16:creationId xmlns:a16="http://schemas.microsoft.com/office/drawing/2014/main" id="{0C74BCC5-E2C9-0F67-2693-AD65A8B5EFC3}"/>
+              </a:ext>
+            </a:extLst>
+          </p:cNvPr>
+          <p:cNvSpPr>
+            <a:spLocks noGrp="1"/>
+          </p:cNvSpPr>
+          <p:nvPr>
+            <p:ph type="title"/>
+          </p:nvPr>
+        </p:nvSpPr>
+        <p:spPr/>
+        <p:txBody>
+          <a:bodyPr/>
+          <a:lstStyle/>
+          <a:p>
+            <a:r>
+              <a:rPr lang="en-US" dirty="0"/>
+              <a:t>TypeScript Modules: Revisit</a:t>
+            </a:r>
+          </a:p>
+        </p:txBody>
+      </p:sp>
+      <p:sp>
+        <p:nvSpPr>
+          <p:cNvPr id="3" name="Content Placeholder 2">
+            <a:extLst>
+              <a:ext uri="{FF2B5EF4-FFF2-40B4-BE49-F238E27FC236}">
+                <a16:creationId xmlns:a16="http://schemas.microsoft.com/office/drawing/2014/main" id="{5BEBB155-497A-8DB3-013A-20F9F38DB862}"/>
+              </a:ext>
+            </a:extLst>
+          </p:cNvPr>
+          <p:cNvSpPr>
+            <a:spLocks noGrp="1"/>
+          </p:cNvSpPr>
+          <p:nvPr>
+            <p:ph idx="1"/>
+          </p:nvPr>
+        </p:nvSpPr>
+        <p:spPr/>
+        <p:txBody>
+          <a:bodyPr/>
+          <a:lstStyle/>
+          <a:p>
+            <a:pPr algn="just"/>
+            <a:r>
+              <a:rPr lang="en-US" dirty="0"/>
+              <a:t>When working with modules, it’s important to also understand the concept of export and import. Access modifiers control access within the TypeScript type system, while module exports control the visibility of JavaScript variables, functions, classes, interfaces, etc., across different files.</a:t>
+            </a:r>
+          </a:p>
+        </p:txBody>
+      </p:sp>
+    </p:spTree>
+    <p:extLst>
+      <p:ext uri="{BB962C8B-B14F-4D97-AF65-F5344CB8AC3E}">
+        <p14:creationId xmlns:p14="http://schemas.microsoft.com/office/powerpoint/2010/main" val="596794367"/>
+      </p:ext>
+    </p:extLst>
+  </p:cSld>
+  <p:clrMapOvr>
+    <a:masterClrMapping/>
+  </p:clrMapOvr>
+</p:sld>
+</file>
+
+<file path=ppt/slides/slide16.xml><?xml version="1.0" encoding="utf-8"?>
+<p:sld xmlns:a="http://schemas.openxmlformats.org/drawingml/2006/main" xmlns:r="http://schemas.openxmlformats.org/officeDocument/2006/relationships" xmlns:p="http://schemas.openxmlformats.org/presentationml/2006/main">
+  <p:cSld>
+    <p:spTree>
+      <p:nvGrpSpPr>
+        <p:cNvPr id="1" name=""/>
+        <p:cNvGrpSpPr/>
+        <p:nvPr/>
+      </p:nvGrpSpPr>
+      <p:grpSpPr>
+        <a:xfrm>
+          <a:off x="0" y="0"/>
+          <a:ext cx="0" cy="0"/>
+          <a:chOff x="0" y="0"/>
+          <a:chExt cx="0" cy="0"/>
+        </a:xfrm>
+      </p:grpSpPr>
+      <p:sp>
+        <p:nvSpPr>
+          <p:cNvPr id="2" name="Title 1">
+            <a:extLst>
+              <a:ext uri="{FF2B5EF4-FFF2-40B4-BE49-F238E27FC236}">
+                <a16:creationId xmlns:a16="http://schemas.microsoft.com/office/drawing/2014/main" id="{BCEE5B7B-F58C-FB24-F1EF-2806C318CEF5}"/>
+              </a:ext>
+            </a:extLst>
+          </p:cNvPr>
+          <p:cNvSpPr>
+            <a:spLocks noGrp="1"/>
+          </p:cNvSpPr>
+          <p:nvPr>
+            <p:ph type="title"/>
+          </p:nvPr>
+        </p:nvSpPr>
+        <p:spPr/>
+        <p:txBody>
+          <a:bodyPr/>
+          <a:lstStyle/>
+          <a:p>
+            <a:r>
+              <a:rPr lang="en-US" dirty="0"/>
+              <a:t>Code Overview of Person/Employee Example</a:t>
+            </a:r>
+          </a:p>
+        </p:txBody>
+      </p:sp>
+      <p:sp>
+        <p:nvSpPr>
+          <p:cNvPr id="3" name="Content Placeholder 2">
+            <a:extLst>
+              <a:ext uri="{FF2B5EF4-FFF2-40B4-BE49-F238E27FC236}">
+                <a16:creationId xmlns:a16="http://schemas.microsoft.com/office/drawing/2014/main" id="{1E9878DF-03BE-014C-4FCB-12B4BBDEC887}"/>
+              </a:ext>
+            </a:extLst>
+          </p:cNvPr>
+          <p:cNvSpPr>
+            <a:spLocks noGrp="1"/>
+          </p:cNvSpPr>
+          <p:nvPr>
+            <p:ph idx="1"/>
+          </p:nvPr>
+        </p:nvSpPr>
+        <p:spPr/>
+        <p:txBody>
+          <a:bodyPr>
+            <a:normAutofit fontScale="85000" lnSpcReduction="20000"/>
+          </a:bodyPr>
+          <a:lstStyle/>
+          <a:p>
+            <a:r>
+              <a:rPr lang="en-US" dirty="0"/>
+              <a:t>The Person class demonstrates the use of public, private, and protected access modifiers.</a:t>
+            </a:r>
+          </a:p>
+          <a:p>
+            <a:r>
+              <a:rPr lang="en-US" dirty="0"/>
+              <a:t>The Employee class extends Person and shows protected access across modules.</a:t>
+            </a:r>
+          </a:p>
+          <a:p>
+            <a:r>
+              <a:rPr lang="en-US" dirty="0"/>
+              <a:t>The </a:t>
+            </a:r>
+            <a:r>
+              <a:rPr lang="en-US" dirty="0" err="1"/>
+              <a:t>main.ts</a:t>
+            </a:r>
+            <a:r>
+              <a:rPr lang="en-US" dirty="0"/>
+              <a:t> file illustrates how these classes and their members are accessed.</a:t>
+            </a:r>
+          </a:p>
+          <a:p>
+            <a:r>
+              <a:rPr lang="en-US" dirty="0"/>
+              <a:t>The public keyword allows members to be accessed from any context, promoting interoperability.</a:t>
+            </a:r>
+          </a:p>
+          <a:p>
+            <a:r>
+              <a:rPr lang="en-US" dirty="0"/>
+              <a:t>The private keyword restricts access to the class itself, safeguarding against unintended external manipulation.</a:t>
+            </a:r>
+          </a:p>
+          <a:p>
+            <a:r>
+              <a:rPr lang="en-US" dirty="0"/>
+              <a:t>The protected keyword enables access within subclasses, facilitating inheritance while maintaining control over member visibility.</a:t>
+            </a:r>
+          </a:p>
+        </p:txBody>
+      </p:sp>
+    </p:spTree>
+    <p:extLst>
+      <p:ext uri="{BB962C8B-B14F-4D97-AF65-F5344CB8AC3E}">
+        <p14:creationId xmlns:p14="http://schemas.microsoft.com/office/powerpoint/2010/main" val="493997708"/>
+      </p:ext>
+    </p:extLst>
+  </p:cSld>
+  <p:clrMapOvr>
+    <a:masterClrMapping/>
+  </p:clrMapOvr>
+</p:sld>
+</file>
+
+<file path=ppt/slides/slide17.xml><?xml version="1.0" encoding="utf-8"?>
+<p:sld xmlns:a="http://schemas.openxmlformats.org/drawingml/2006/main" xmlns:r="http://schemas.openxmlformats.org/officeDocument/2006/relationships" xmlns:p="http://schemas.openxmlformats.org/presentationml/2006/main">
+  <p:cSld>
+    <p:spTree>
+      <p:nvGrpSpPr>
+        <p:cNvPr id="1" name=""/>
+        <p:cNvGrpSpPr/>
+        <p:nvPr/>
+      </p:nvGrpSpPr>
+      <p:grpSpPr>
+        <a:xfrm>
+          <a:off x="0" y="0"/>
+          <a:ext cx="0" cy="0"/>
+          <a:chOff x="0" y="0"/>
+          <a:chExt cx="0" cy="0"/>
+        </a:xfrm>
+      </p:grpSpPr>
+      <p:sp>
+        <p:nvSpPr>
+          <p:cNvPr id="2" name="Title 1">
+            <a:extLst>
+              <a:ext uri="{FF2B5EF4-FFF2-40B4-BE49-F238E27FC236}">
+                <a16:creationId xmlns:a16="http://schemas.microsoft.com/office/drawing/2014/main" id="{B8237B1A-5F21-82D4-9768-EFB6E047D582}"/>
+              </a:ext>
+            </a:extLst>
+          </p:cNvPr>
+          <p:cNvSpPr>
+            <a:spLocks noGrp="1"/>
+          </p:cNvSpPr>
+          <p:nvPr>
+            <p:ph type="title"/>
+          </p:nvPr>
+        </p:nvSpPr>
+        <p:spPr/>
+        <p:txBody>
+          <a:bodyPr/>
+          <a:lstStyle/>
+          <a:p>
+            <a:r>
+              <a:rPr lang="en-US" dirty="0"/>
+              <a:t>Key Takeaway from Person/Employee Class Example</a:t>
+            </a:r>
+          </a:p>
+        </p:txBody>
+      </p:sp>
+      <p:sp>
+        <p:nvSpPr>
+          <p:cNvPr id="3" name="Content Placeholder 2">
+            <a:extLst>
+              <a:ext uri="{FF2B5EF4-FFF2-40B4-BE49-F238E27FC236}">
+                <a16:creationId xmlns:a16="http://schemas.microsoft.com/office/drawing/2014/main" id="{611C49BD-C57B-0AD6-99FD-98643110CE4E}"/>
+              </a:ext>
+            </a:extLst>
+          </p:cNvPr>
+          <p:cNvSpPr>
+            <a:spLocks noGrp="1"/>
+          </p:cNvSpPr>
+          <p:nvPr>
+            <p:ph idx="1"/>
+          </p:nvPr>
+        </p:nvSpPr>
+        <p:spPr/>
+        <p:txBody>
+          <a:bodyPr/>
+          <a:lstStyle/>
+          <a:p>
+            <a:r>
+              <a:rPr lang="en-US" dirty="0"/>
+              <a:t>Key Takeaways:</a:t>
+            </a:r>
+          </a:p>
+          <a:p>
+            <a:pPr lvl="1"/>
+            <a:r>
+              <a:rPr lang="en-US" dirty="0"/>
+              <a:t>Access modifiers help manage the scope and security of class members.</a:t>
+            </a:r>
+          </a:p>
+          <a:p>
+            <a:pPr lvl="1"/>
+            <a:r>
+              <a:rPr lang="en-US" dirty="0"/>
+              <a:t>TypeScript’s static type checking enforces these access levels at compile time, not at runtime.</a:t>
+            </a:r>
+          </a:p>
+          <a:p>
+            <a:pPr lvl="1"/>
+            <a:r>
+              <a:rPr lang="en-US" dirty="0"/>
+              <a:t>Understanding and correctly applying access modifiers is crucial for robust and maintainable code architecture.</a:t>
+            </a:r>
+          </a:p>
+        </p:txBody>
+      </p:sp>
+    </p:spTree>
+    <p:extLst>
+      <p:ext uri="{BB962C8B-B14F-4D97-AF65-F5344CB8AC3E}">
+        <p14:creationId xmlns:p14="http://schemas.microsoft.com/office/powerpoint/2010/main" val="4247290450"/>
+      </p:ext>
+    </p:extLst>
+  </p:cSld>
+  <p:clrMapOvr>
+    <a:masterClrMapping/>
+  </p:clrMapOvr>
+</p:sld>
+</file>
+
+<file path=ppt/slides/slide18.xml><?xml version="1.0" encoding="utf-8"?>
 <p:sld xmlns:a="http://schemas.openxmlformats.org/drawingml/2006/main" xmlns:r="http://schemas.openxmlformats.org/officeDocument/2006/relationships" xmlns:p="http://schemas.openxmlformats.org/presentationml/2006/main">
   <p:cSld>
     <p:spTree>

</xml_diff>